<commit_message>
final project and ppt
</commit_message>
<xml_diff>
--- a/Presentation.pptx
+++ b/Presentation.pptx
@@ -1194,6 +1194,35 @@
                 <a:cs typeface="Calibri"/>
               </a:rPr>
               <a:t> format and contain useful info</a:t>
+            </a:r>
+          </a:p>
+          <a:p>
+            <a:endParaRPr lang="en-US" dirty="0">
+              <a:ea typeface="Calibri"/>
+              <a:cs typeface="Calibri"/>
+            </a:endParaRPr>
+          </a:p>
+          <a:p>
+            <a:r>
+              <a:rPr lang="en-US" dirty="0">
+                <a:ea typeface="Calibri"/>
+                <a:cs typeface="Calibri"/>
+              </a:rPr>
+              <a:t>By playing a particular set of opening moves, the White player can coerce the Black player into responding in a predictable way. This leads to common positions appearing in lots </a:t>
+            </a:r>
+            <a:r>
+              <a:rPr lang="en-US" dirty="0" err="1">
+                <a:ea typeface="Calibri"/>
+                <a:cs typeface="Calibri"/>
+              </a:rPr>
+              <a:t>fo</a:t>
+            </a:r>
+            <a:r>
+              <a:rPr lang="en-US" dirty="0">
+                <a:ea typeface="Calibri"/>
+                <a:cs typeface="Calibri"/>
+              </a:rPr>
+              <a:t> games which have been catalogued and given alphanumeric codes. </a:t>
             </a:r>
           </a:p>
           <a:p>
@@ -9476,6 +9505,307 @@
   <p:clrMapOvr>
     <a:masterClrMapping/>
   </p:clrMapOvr>
+  <p:timing>
+    <p:tnLst>
+      <p:par>
+        <p:cTn id="1" dur="indefinite" restart="never" nodeType="tmRoot">
+          <p:childTnLst>
+            <p:seq concurrent="1" nextAc="seek">
+              <p:cTn id="2" dur="indefinite" nodeType="mainSeq">
+                <p:childTnLst>
+                  <p:par>
+                    <p:cTn id="3" fill="hold">
+                      <p:stCondLst>
+                        <p:cond delay="indefinite"/>
+                      </p:stCondLst>
+                      <p:childTnLst>
+                        <p:par>
+                          <p:cTn id="4" fill="hold">
+                            <p:stCondLst>
+                              <p:cond delay="0"/>
+                            </p:stCondLst>
+                            <p:childTnLst>
+                              <p:par>
+                                <p:cTn id="5" presetID="1" presetClass="entr" presetSubtype="0" fill="hold" nodeType="clickEffect">
+                                  <p:stCondLst>
+                                    <p:cond delay="0"/>
+                                  </p:stCondLst>
+                                  <p:childTnLst>
+                                    <p:set>
+                                      <p:cBhvr>
+                                        <p:cTn id="6" dur="1" fill="hold">
+                                          <p:stCondLst>
+                                            <p:cond delay="0"/>
+                                          </p:stCondLst>
+                                        </p:cTn>
+                                        <p:tgtEl>
+                                          <p:spTgt spid="5">
+                                            <p:txEl>
+                                              <p:pRg st="0" end="0"/>
+                                            </p:txEl>
+                                          </p:spTgt>
+                                        </p:tgtEl>
+                                        <p:attrNameLst>
+                                          <p:attrName>style.visibility</p:attrName>
+                                        </p:attrNameLst>
+                                      </p:cBhvr>
+                                      <p:to>
+                                        <p:strVal val="visible"/>
+                                      </p:to>
+                                    </p:set>
+                                  </p:childTnLst>
+                                </p:cTn>
+                              </p:par>
+                              <p:par>
+                                <p:cTn id="7" presetID="1" presetClass="entr" presetSubtype="0" fill="hold" nodeType="withEffect">
+                                  <p:stCondLst>
+                                    <p:cond delay="0"/>
+                                  </p:stCondLst>
+                                  <p:childTnLst>
+                                    <p:set>
+                                      <p:cBhvr>
+                                        <p:cTn id="8" dur="1" fill="hold">
+                                          <p:stCondLst>
+                                            <p:cond delay="0"/>
+                                          </p:stCondLst>
+                                        </p:cTn>
+                                        <p:tgtEl>
+                                          <p:spTgt spid="5">
+                                            <p:txEl>
+                                              <p:pRg st="1" end="1"/>
+                                            </p:txEl>
+                                          </p:spTgt>
+                                        </p:tgtEl>
+                                        <p:attrNameLst>
+                                          <p:attrName>style.visibility</p:attrName>
+                                        </p:attrNameLst>
+                                      </p:cBhvr>
+                                      <p:to>
+                                        <p:strVal val="visible"/>
+                                      </p:to>
+                                    </p:set>
+                                  </p:childTnLst>
+                                </p:cTn>
+                              </p:par>
+                              <p:par>
+                                <p:cTn id="9" presetID="1" presetClass="entr" presetSubtype="0" fill="hold" nodeType="withEffect">
+                                  <p:stCondLst>
+                                    <p:cond delay="0"/>
+                                  </p:stCondLst>
+                                  <p:childTnLst>
+                                    <p:set>
+                                      <p:cBhvr>
+                                        <p:cTn id="10" dur="1" fill="hold">
+                                          <p:stCondLst>
+                                            <p:cond delay="0"/>
+                                          </p:stCondLst>
+                                        </p:cTn>
+                                        <p:tgtEl>
+                                          <p:spTgt spid="5">
+                                            <p:txEl>
+                                              <p:pRg st="2" end="2"/>
+                                            </p:txEl>
+                                          </p:spTgt>
+                                        </p:tgtEl>
+                                        <p:attrNameLst>
+                                          <p:attrName>style.visibility</p:attrName>
+                                        </p:attrNameLst>
+                                      </p:cBhvr>
+                                      <p:to>
+                                        <p:strVal val="visible"/>
+                                      </p:to>
+                                    </p:set>
+                                  </p:childTnLst>
+                                </p:cTn>
+                              </p:par>
+                            </p:childTnLst>
+                          </p:cTn>
+                        </p:par>
+                      </p:childTnLst>
+                    </p:cTn>
+                  </p:par>
+                  <p:par>
+                    <p:cTn id="11" fill="hold">
+                      <p:stCondLst>
+                        <p:cond delay="indefinite"/>
+                      </p:stCondLst>
+                      <p:childTnLst>
+                        <p:par>
+                          <p:cTn id="12" fill="hold">
+                            <p:stCondLst>
+                              <p:cond delay="0"/>
+                            </p:stCondLst>
+                            <p:childTnLst>
+                              <p:par>
+                                <p:cTn id="13" presetID="1" presetClass="entr" presetSubtype="0" fill="hold" nodeType="clickEffect">
+                                  <p:stCondLst>
+                                    <p:cond delay="0"/>
+                                  </p:stCondLst>
+                                  <p:childTnLst>
+                                    <p:set>
+                                      <p:cBhvr>
+                                        <p:cTn id="14" dur="1" fill="hold">
+                                          <p:stCondLst>
+                                            <p:cond delay="0"/>
+                                          </p:stCondLst>
+                                        </p:cTn>
+                                        <p:tgtEl>
+                                          <p:spTgt spid="5">
+                                            <p:txEl>
+                                              <p:pRg st="3" end="3"/>
+                                            </p:txEl>
+                                          </p:spTgt>
+                                        </p:tgtEl>
+                                        <p:attrNameLst>
+                                          <p:attrName>style.visibility</p:attrName>
+                                        </p:attrNameLst>
+                                      </p:cBhvr>
+                                      <p:to>
+                                        <p:strVal val="visible"/>
+                                      </p:to>
+                                    </p:set>
+                                  </p:childTnLst>
+                                </p:cTn>
+                              </p:par>
+                              <p:par>
+                                <p:cTn id="15" presetID="1" presetClass="entr" presetSubtype="0" fill="hold" nodeType="withEffect">
+                                  <p:stCondLst>
+                                    <p:cond delay="0"/>
+                                  </p:stCondLst>
+                                  <p:childTnLst>
+                                    <p:set>
+                                      <p:cBhvr>
+                                        <p:cTn id="16" dur="1" fill="hold">
+                                          <p:stCondLst>
+                                            <p:cond delay="0"/>
+                                          </p:stCondLst>
+                                        </p:cTn>
+                                        <p:tgtEl>
+                                          <p:spTgt spid="5">
+                                            <p:txEl>
+                                              <p:pRg st="4" end="4"/>
+                                            </p:txEl>
+                                          </p:spTgt>
+                                        </p:tgtEl>
+                                        <p:attrNameLst>
+                                          <p:attrName>style.visibility</p:attrName>
+                                        </p:attrNameLst>
+                                      </p:cBhvr>
+                                      <p:to>
+                                        <p:strVal val="visible"/>
+                                      </p:to>
+                                    </p:set>
+                                  </p:childTnLst>
+                                </p:cTn>
+                              </p:par>
+                            </p:childTnLst>
+                          </p:cTn>
+                        </p:par>
+                      </p:childTnLst>
+                    </p:cTn>
+                  </p:par>
+                  <p:par>
+                    <p:cTn id="17" fill="hold">
+                      <p:stCondLst>
+                        <p:cond delay="indefinite"/>
+                      </p:stCondLst>
+                      <p:childTnLst>
+                        <p:par>
+                          <p:cTn id="18" fill="hold">
+                            <p:stCondLst>
+                              <p:cond delay="0"/>
+                            </p:stCondLst>
+                            <p:childTnLst>
+                              <p:par>
+                                <p:cTn id="19" presetID="1" presetClass="entr" presetSubtype="0" fill="hold" nodeType="clickEffect">
+                                  <p:stCondLst>
+                                    <p:cond delay="0"/>
+                                  </p:stCondLst>
+                                  <p:childTnLst>
+                                    <p:set>
+                                      <p:cBhvr>
+                                        <p:cTn id="20" dur="1" fill="hold">
+                                          <p:stCondLst>
+                                            <p:cond delay="0"/>
+                                          </p:stCondLst>
+                                        </p:cTn>
+                                        <p:tgtEl>
+                                          <p:spTgt spid="5">
+                                            <p:txEl>
+                                              <p:pRg st="5" end="5"/>
+                                            </p:txEl>
+                                          </p:spTgt>
+                                        </p:tgtEl>
+                                        <p:attrNameLst>
+                                          <p:attrName>style.visibility</p:attrName>
+                                        </p:attrNameLst>
+                                      </p:cBhvr>
+                                      <p:to>
+                                        <p:strVal val="visible"/>
+                                      </p:to>
+                                    </p:set>
+                                  </p:childTnLst>
+                                </p:cTn>
+                              </p:par>
+                              <p:par>
+                                <p:cTn id="21" presetID="1" presetClass="entr" presetSubtype="0" fill="hold" nodeType="withEffect">
+                                  <p:stCondLst>
+                                    <p:cond delay="0"/>
+                                  </p:stCondLst>
+                                  <p:childTnLst>
+                                    <p:set>
+                                      <p:cBhvr>
+                                        <p:cTn id="22" dur="1" fill="hold">
+                                          <p:stCondLst>
+                                            <p:cond delay="0"/>
+                                          </p:stCondLst>
+                                        </p:cTn>
+                                        <p:tgtEl>
+                                          <p:spTgt spid="5">
+                                            <p:txEl>
+                                              <p:pRg st="6" end="6"/>
+                                            </p:txEl>
+                                          </p:spTgt>
+                                        </p:tgtEl>
+                                        <p:attrNameLst>
+                                          <p:attrName>style.visibility</p:attrName>
+                                        </p:attrNameLst>
+                                      </p:cBhvr>
+                                      <p:to>
+                                        <p:strVal val="visible"/>
+                                      </p:to>
+                                    </p:set>
+                                  </p:childTnLst>
+                                </p:cTn>
+                              </p:par>
+                            </p:childTnLst>
+                          </p:cTn>
+                        </p:par>
+                      </p:childTnLst>
+                    </p:cTn>
+                  </p:par>
+                </p:childTnLst>
+              </p:cTn>
+              <p:prevCondLst>
+                <p:cond evt="onPrev" delay="0">
+                  <p:tgtEl>
+                    <p:sldTgt/>
+                  </p:tgtEl>
+                </p:cond>
+              </p:prevCondLst>
+              <p:nextCondLst>
+                <p:cond evt="onNext" delay="0">
+                  <p:tgtEl>
+                    <p:sldTgt/>
+                  </p:tgtEl>
+                </p:cond>
+              </p:nextCondLst>
+            </p:seq>
+          </p:childTnLst>
+        </p:cTn>
+      </p:par>
+    </p:tnLst>
+  </p:timing>
 </p:sld>
 </file>
 
@@ -12354,6 +12684,15 @@
 </file>
 
 <file path=customXml/item1.xml><?xml version="1.0" encoding="utf-8"?>
+<?mso-contentType ?>
+<FormTemplates xmlns="http://schemas.microsoft.com/sharepoint/v3/contenttype/forms">
+  <Display>DocumentLibraryForm</Display>
+  <Edit>DocumentLibraryForm</Edit>
+  <New>DocumentLibraryForm</New>
+</FormTemplates>
+</file>
+
+<file path=customXml/item2.xml><?xml version="1.0" encoding="utf-8"?>
 <p:properties xmlns:p="http://schemas.microsoft.com/office/2006/metadata/properties" xmlns:xsi="http://www.w3.org/2001/XMLSchema-instance" xmlns:pc="http://schemas.microsoft.com/office/infopath/2007/PartnerControls">
   <documentManagement>
     <Status xmlns="71af3243-3dd4-4a8d-8c0d-dd76da1f02a5">Not started</Status>
@@ -12370,15 +12709,6 @@
     <MediaServiceKeyPoints xmlns="71af3243-3dd4-4a8d-8c0d-dd76da1f02a5" xsi:nil="true"/>
   </documentManagement>
 </p:properties>
-</file>
-
-<file path=customXml/item2.xml><?xml version="1.0" encoding="utf-8"?>
-<?mso-contentType ?>
-<FormTemplates xmlns="http://schemas.microsoft.com/sharepoint/v3/contenttype/forms">
-  <Display>DocumentLibraryForm</Display>
-  <Edit>DocumentLibraryForm</Edit>
-  <New>DocumentLibraryForm</New>
-</FormTemplates>
 </file>
 
 <file path=customXml/item3.xml><?xml version="1.0" encoding="utf-8"?>
@@ -12658,6 +12988,14 @@
 </file>
 
 <file path=customXml/itemProps1.xml><?xml version="1.0" encoding="utf-8"?>
+<ds:datastoreItem xmlns:ds="http://schemas.openxmlformats.org/officeDocument/2006/customXml" ds:itemID="{D6DA60BD-0042-4722-B671-D551884D1EED}">
+  <ds:schemaRefs>
+    <ds:schemaRef ds:uri="http://schemas.microsoft.com/sharepoint/v3/contenttype/forms"/>
+  </ds:schemaRefs>
+</ds:datastoreItem>
+</file>
+
+<file path=customXml/itemProps2.xml><?xml version="1.0" encoding="utf-8"?>
 <ds:datastoreItem xmlns:ds="http://schemas.openxmlformats.org/officeDocument/2006/customXml" ds:itemID="{AC069F72-2015-4FB6-9588-A49CB14BDC12}">
   <ds:schemaRefs>
     <ds:schemaRef ds:uri="http://schemas.microsoft.com/office/2006/metadata/properties"/>
@@ -12665,14 +13003,6 @@
     <ds:schemaRef ds:uri="71af3243-3dd4-4a8d-8c0d-dd76da1f02a5"/>
     <ds:schemaRef ds:uri="http://schemas.microsoft.com/sharepoint/v3"/>
     <ds:schemaRef ds:uri="230e9df3-be65-4c73-a93b-d1236ebd677e"/>
-  </ds:schemaRefs>
-</ds:datastoreItem>
-</file>
-
-<file path=customXml/itemProps2.xml><?xml version="1.0" encoding="utf-8"?>
-<ds:datastoreItem xmlns:ds="http://schemas.openxmlformats.org/officeDocument/2006/customXml" ds:itemID="{D6DA60BD-0042-4722-B671-D551884D1EED}">
-  <ds:schemaRefs>
-    <ds:schemaRef ds:uri="http://schemas.microsoft.com/sharepoint/v3/contenttype/forms"/>
   </ds:schemaRefs>
 </ds:datastoreItem>
 </file>

</xml_diff>